<commit_message>
Added a line thickness slide to Georeferencing.pptx.
</commit_message>
<xml_diff>
--- a/Georeferencing.pptx
+++ b/Georeferencing.pptx
@@ -9,6 +9,7 @@
     <p:sldId id="259" r:id="rId3"/>
     <p:sldId id="256" r:id="rId4"/>
     <p:sldId id="257" r:id="rId5"/>
+    <p:sldId id="260" r:id="rId6"/>
   </p:sldIdLst>
   <p:sldSz cx="9144000" cy="6858000" type="screen4x3"/>
   <p:notesSz cx="6858000" cy="9144000"/>
@@ -291,7 +292,8 @@
           <a:p>
             <a:fld id="{F7CCA857-6925-7F43-A7C0-D391767F480B}" type="datetimeFigureOut">
               <a:rPr lang="en-US" smtClean="0"/>
-              <a:t>10/24/14</a:t>
+              <a:pPr/>
+              <a:t>11/4/14</a:t>
             </a:fld>
             <a:endParaRPr lang="en-US"/>
           </a:p>
@@ -333,6 +335,7 @@
           <a:p>
             <a:fld id="{DC477408-D34B-9D4D-ACCA-01183A9963F5}" type="slidenum">
               <a:rPr lang="en-US" smtClean="0"/>
+              <a:pPr/>
               <a:t>‹#›</a:t>
             </a:fld>
             <a:endParaRPr lang="en-US"/>
@@ -456,7 +459,8 @@
           <a:p>
             <a:fld id="{F7CCA857-6925-7F43-A7C0-D391767F480B}" type="datetimeFigureOut">
               <a:rPr lang="en-US" smtClean="0"/>
-              <a:t>10/24/14</a:t>
+              <a:pPr/>
+              <a:t>11/4/14</a:t>
             </a:fld>
             <a:endParaRPr lang="en-US"/>
           </a:p>
@@ -498,6 +502,7 @@
           <a:p>
             <a:fld id="{DC477408-D34B-9D4D-ACCA-01183A9963F5}" type="slidenum">
               <a:rPr lang="en-US" smtClean="0"/>
+              <a:pPr/>
               <a:t>‹#›</a:t>
             </a:fld>
             <a:endParaRPr lang="en-US"/>
@@ -631,7 +636,8 @@
           <a:p>
             <a:fld id="{F7CCA857-6925-7F43-A7C0-D391767F480B}" type="datetimeFigureOut">
               <a:rPr lang="en-US" smtClean="0"/>
-              <a:t>10/24/14</a:t>
+              <a:pPr/>
+              <a:t>11/4/14</a:t>
             </a:fld>
             <a:endParaRPr lang="en-US"/>
           </a:p>
@@ -673,6 +679,7 @@
           <a:p>
             <a:fld id="{DC477408-D34B-9D4D-ACCA-01183A9963F5}" type="slidenum">
               <a:rPr lang="en-US" smtClean="0"/>
+              <a:pPr/>
               <a:t>‹#›</a:t>
             </a:fld>
             <a:endParaRPr lang="en-US"/>
@@ -796,7 +803,8 @@
           <a:p>
             <a:fld id="{F7CCA857-6925-7F43-A7C0-D391767F480B}" type="datetimeFigureOut">
               <a:rPr lang="en-US" smtClean="0"/>
-              <a:t>10/24/14</a:t>
+              <a:pPr/>
+              <a:t>11/4/14</a:t>
             </a:fld>
             <a:endParaRPr lang="en-US"/>
           </a:p>
@@ -838,6 +846,7 @@
           <a:p>
             <a:fld id="{DC477408-D34B-9D4D-ACCA-01183A9963F5}" type="slidenum">
               <a:rPr lang="en-US" smtClean="0"/>
+              <a:pPr/>
               <a:t>‹#›</a:t>
             </a:fld>
             <a:endParaRPr lang="en-US"/>
@@ -1037,7 +1046,8 @@
           <a:p>
             <a:fld id="{F7CCA857-6925-7F43-A7C0-D391767F480B}" type="datetimeFigureOut">
               <a:rPr lang="en-US" smtClean="0"/>
-              <a:t>10/24/14</a:t>
+              <a:pPr/>
+              <a:t>11/4/14</a:t>
             </a:fld>
             <a:endParaRPr lang="en-US"/>
           </a:p>
@@ -1079,6 +1089,7 @@
           <a:p>
             <a:fld id="{DC477408-D34B-9D4D-ACCA-01183A9963F5}" type="slidenum">
               <a:rPr lang="en-US" smtClean="0"/>
+              <a:pPr/>
               <a:t>‹#›</a:t>
             </a:fld>
             <a:endParaRPr lang="en-US"/>
@@ -1320,7 +1331,8 @@
           <a:p>
             <a:fld id="{F7CCA857-6925-7F43-A7C0-D391767F480B}" type="datetimeFigureOut">
               <a:rPr lang="en-US" smtClean="0"/>
-              <a:t>10/24/14</a:t>
+              <a:pPr/>
+              <a:t>11/4/14</a:t>
             </a:fld>
             <a:endParaRPr lang="en-US"/>
           </a:p>
@@ -1362,6 +1374,7 @@
           <a:p>
             <a:fld id="{DC477408-D34B-9D4D-ACCA-01183A9963F5}" type="slidenum">
               <a:rPr lang="en-US" smtClean="0"/>
+              <a:pPr/>
               <a:t>‹#›</a:t>
             </a:fld>
             <a:endParaRPr lang="en-US"/>
@@ -1737,7 +1750,8 @@
           <a:p>
             <a:fld id="{F7CCA857-6925-7F43-A7C0-D391767F480B}" type="datetimeFigureOut">
               <a:rPr lang="en-US" smtClean="0"/>
-              <a:t>10/24/14</a:t>
+              <a:pPr/>
+              <a:t>11/4/14</a:t>
             </a:fld>
             <a:endParaRPr lang="en-US"/>
           </a:p>
@@ -1779,6 +1793,7 @@
           <a:p>
             <a:fld id="{DC477408-D34B-9D4D-ACCA-01183A9963F5}" type="slidenum">
               <a:rPr lang="en-US" smtClean="0"/>
+              <a:pPr/>
               <a:t>‹#›</a:t>
             </a:fld>
             <a:endParaRPr lang="en-US"/>
@@ -1850,7 +1865,8 @@
           <a:p>
             <a:fld id="{F7CCA857-6925-7F43-A7C0-D391767F480B}" type="datetimeFigureOut">
               <a:rPr lang="en-US" smtClean="0"/>
-              <a:t>10/24/14</a:t>
+              <a:pPr/>
+              <a:t>11/4/14</a:t>
             </a:fld>
             <a:endParaRPr lang="en-US"/>
           </a:p>
@@ -1892,6 +1908,7 @@
           <a:p>
             <a:fld id="{DC477408-D34B-9D4D-ACCA-01183A9963F5}" type="slidenum">
               <a:rPr lang="en-US" smtClean="0"/>
+              <a:pPr/>
               <a:t>‹#›</a:t>
             </a:fld>
             <a:endParaRPr lang="en-US"/>
@@ -1940,7 +1957,8 @@
           <a:p>
             <a:fld id="{F7CCA857-6925-7F43-A7C0-D391767F480B}" type="datetimeFigureOut">
               <a:rPr lang="en-US" smtClean="0"/>
-              <a:t>10/24/14</a:t>
+              <a:pPr/>
+              <a:t>11/4/14</a:t>
             </a:fld>
             <a:endParaRPr lang="en-US"/>
           </a:p>
@@ -1982,6 +2000,7 @@
           <a:p>
             <a:fld id="{DC477408-D34B-9D4D-ACCA-01183A9963F5}" type="slidenum">
               <a:rPr lang="en-US" smtClean="0"/>
+              <a:pPr/>
               <a:t>‹#›</a:t>
             </a:fld>
             <a:endParaRPr lang="en-US"/>
@@ -2212,7 +2231,8 @@
           <a:p>
             <a:fld id="{F7CCA857-6925-7F43-A7C0-D391767F480B}" type="datetimeFigureOut">
               <a:rPr lang="en-US" smtClean="0"/>
-              <a:t>10/24/14</a:t>
+              <a:pPr/>
+              <a:t>11/4/14</a:t>
             </a:fld>
             <a:endParaRPr lang="en-US"/>
           </a:p>
@@ -2254,6 +2274,7 @@
           <a:p>
             <a:fld id="{DC477408-D34B-9D4D-ACCA-01183A9963F5}" type="slidenum">
               <a:rPr lang="en-US" smtClean="0"/>
+              <a:pPr/>
               <a:t>‹#›</a:t>
             </a:fld>
             <a:endParaRPr lang="en-US"/>
@@ -2460,7 +2481,8 @@
           <a:p>
             <a:fld id="{F7CCA857-6925-7F43-A7C0-D391767F480B}" type="datetimeFigureOut">
               <a:rPr lang="en-US" smtClean="0"/>
-              <a:t>10/24/14</a:t>
+              <a:pPr/>
+              <a:t>11/4/14</a:t>
             </a:fld>
             <a:endParaRPr lang="en-US"/>
           </a:p>
@@ -2502,6 +2524,7 @@
           <a:p>
             <a:fld id="{DC477408-D34B-9D4D-ACCA-01183A9963F5}" type="slidenum">
               <a:rPr lang="en-US" smtClean="0"/>
+              <a:pPr/>
               <a:t>‹#›</a:t>
             </a:fld>
             <a:endParaRPr lang="en-US"/>
@@ -2668,7 +2691,8 @@
           <a:p>
             <a:fld id="{F7CCA857-6925-7F43-A7C0-D391767F480B}" type="datetimeFigureOut">
               <a:rPr lang="en-US" smtClean="0"/>
-              <a:t>10/24/14</a:t>
+              <a:pPr/>
+              <a:t>11/4/14</a:t>
             </a:fld>
             <a:endParaRPr lang="en-US"/>
           </a:p>
@@ -2746,6 +2770,7 @@
           <a:p>
             <a:fld id="{DC477408-D34B-9D4D-ACCA-01183A9963F5}" type="slidenum">
               <a:rPr lang="en-US" smtClean="0"/>
+              <a:pPr/>
               <a:t>‹#›</a:t>
             </a:fld>
             <a:endParaRPr lang="en-US"/>
@@ -3428,7 +3453,6 @@
               <a:rPr lang="en-US" dirty="0" smtClean="0"/>
               <a:t>6) 19, 256</a:t>
             </a:r>
-            <a:endParaRPr lang="en-US" dirty="0" smtClean="0"/>
           </a:p>
         </p:txBody>
       </p:sp>
@@ -3688,6 +3712,186 @@
               <a:rPr lang="en-US" dirty="0" smtClean="0"/>
               <a:t>Light Gray solid works great!</a:t>
             </a:r>
+          </a:p>
+        </p:txBody>
+      </p:sp>
+    </p:spTree>
+  </p:cSld>
+  <p:clrMapOvr>
+    <a:masterClrMapping/>
+  </p:clrMapOvr>
+</p:sld>
+</file>
+
+<file path=ppt/slides/slide5.xml><?xml version="1.0" encoding="utf-8"?>
+<p:sld xmlns:a="http://schemas.openxmlformats.org/drawingml/2006/main" xmlns:r="http://schemas.openxmlformats.org/officeDocument/2006/relationships" xmlns:mc="http://schemas.openxmlformats.org/markup-compatibility/2006" xmlns:mv="urn:schemas-microsoft-com:mac:vml" xmlns:p="http://schemas.openxmlformats.org/presentationml/2006/main" mc:Ignorable="mv" mc:PreserveAttributes="mv:*">
+  <p:cSld>
+    <p:spTree>
+      <p:nvGrpSpPr>
+        <p:cNvPr id="1" name=""/>
+        <p:cNvGrpSpPr/>
+        <p:nvPr/>
+      </p:nvGrpSpPr>
+      <p:grpSpPr>
+        <a:xfrm>
+          <a:off x="0" y="0"/>
+          <a:ext cx="0" cy="0"/>
+          <a:chOff x="0" y="0"/>
+          <a:chExt cx="0" cy="0"/>
+        </a:xfrm>
+      </p:grpSpPr>
+      <p:sp>
+        <p:nvSpPr>
+          <p:cNvPr id="2" name="Title 1"/>
+          <p:cNvSpPr>
+            <a:spLocks noGrp="1"/>
+          </p:cNvSpPr>
+          <p:nvPr>
+            <p:ph type="title"/>
+          </p:nvPr>
+        </p:nvSpPr>
+        <p:spPr/>
+        <p:txBody>
+          <a:bodyPr/>
+          <a:lstStyle/>
+          <a:p>
+            <a:r>
+              <a:rPr lang="en-US" dirty="0" smtClean="0"/>
+              <a:t>Differences in Line Thickness</a:t>
+            </a:r>
+            <a:endParaRPr lang="en-US" dirty="0"/>
+          </a:p>
+        </p:txBody>
+      </p:sp>
+      <p:pic>
+        <p:nvPicPr>
+          <p:cNvPr id="4" name="Picture 3"/>
+          <p:cNvPicPr>
+            <a:picLocks noChangeAspect="1"/>
+          </p:cNvPicPr>
+          <p:nvPr/>
+        </p:nvPicPr>
+        <p:blipFill>
+          <a:blip r:embed="rId2"/>
+          <a:stretch>
+            <a:fillRect/>
+          </a:stretch>
+        </p:blipFill>
+        <p:spPr>
+          <a:xfrm>
+            <a:off x="624660" y="2059649"/>
+            <a:ext cx="3688080" cy="2419350"/>
+          </a:xfrm>
+          <a:prstGeom prst="rect">
+            <a:avLst/>
+          </a:prstGeom>
+          <a:ln>
+            <a:solidFill>
+              <a:schemeClr val="tx2">
+                <a:lumMod val="60000"/>
+                <a:lumOff val="40000"/>
+              </a:schemeClr>
+            </a:solidFill>
+          </a:ln>
+        </p:spPr>
+      </p:pic>
+      <p:pic>
+        <p:nvPicPr>
+          <p:cNvPr id="5" name="Picture 4"/>
+          <p:cNvPicPr>
+            <a:picLocks noChangeAspect="1"/>
+          </p:cNvPicPr>
+          <p:nvPr/>
+        </p:nvPicPr>
+        <p:blipFill>
+          <a:blip r:embed="rId3"/>
+          <a:stretch>
+            <a:fillRect/>
+          </a:stretch>
+        </p:blipFill>
+        <p:spPr>
+          <a:xfrm>
+            <a:off x="4768366" y="2048219"/>
+            <a:ext cx="3691890" cy="2430780"/>
+          </a:xfrm>
+          <a:prstGeom prst="rect">
+            <a:avLst/>
+          </a:prstGeom>
+          <a:ln>
+            <a:solidFill>
+              <a:schemeClr val="tx2">
+                <a:lumMod val="60000"/>
+                <a:lumOff val="40000"/>
+              </a:schemeClr>
+            </a:solidFill>
+          </a:ln>
+        </p:spPr>
+      </p:pic>
+      <p:sp>
+        <p:nvSpPr>
+          <p:cNvPr id="6" name="TextBox 5"/>
+          <p:cNvSpPr txBox="1"/>
+          <p:nvPr/>
+        </p:nvSpPr>
+        <p:spPr>
+          <a:xfrm>
+            <a:off x="4793362" y="4815080"/>
+            <a:ext cx="4270223" cy="369332"/>
+          </a:xfrm>
+          <a:prstGeom prst="rect">
+            <a:avLst/>
+          </a:prstGeom>
+          <a:noFill/>
+        </p:spPr>
+        <p:txBody>
+          <a:bodyPr wrap="square" rtlCol="0">
+            <a:spAutoFit/>
+          </a:bodyPr>
+          <a:lstStyle/>
+          <a:p>
+            <a:r>
+              <a:rPr lang="en-US" dirty="0" smtClean="0"/>
+              <a:t>N_73_01.tiff (Black-capped </a:t>
+            </a:r>
+            <a:r>
+              <a:rPr lang="en-US" dirty="0" err="1" smtClean="0"/>
+              <a:t>Donacobius</a:t>
+            </a:r>
+            <a:r>
+              <a:rPr lang="en-US" dirty="0" smtClean="0"/>
+              <a:t>)</a:t>
+            </a:r>
+            <a:endParaRPr lang="en-US" dirty="0"/>
+          </a:p>
+        </p:txBody>
+      </p:sp>
+      <p:sp>
+        <p:nvSpPr>
+          <p:cNvPr id="7" name="TextBox 6"/>
+          <p:cNvSpPr txBox="1"/>
+          <p:nvPr/>
+        </p:nvSpPr>
+        <p:spPr>
+          <a:xfrm>
+            <a:off x="661585" y="4815080"/>
+            <a:ext cx="3231856" cy="369332"/>
+          </a:xfrm>
+          <a:prstGeom prst="rect">
+            <a:avLst/>
+          </a:prstGeom>
+          <a:noFill/>
+        </p:spPr>
+        <p:txBody>
+          <a:bodyPr wrap="square" rtlCol="0">
+            <a:spAutoFit/>
+          </a:bodyPr>
+          <a:lstStyle/>
+          <a:p>
+            <a:r>
+              <a:rPr lang="en-US" dirty="0" smtClean="0"/>
+              <a:t>N_73_02.tiff (Thrush-like Wren)</a:t>
+            </a:r>
+            <a:endParaRPr lang="en-US" dirty="0"/>
           </a:p>
         </p:txBody>
       </p:sp>

</xml_diff>

<commit_message>
A minor edit to info about stars in Georeferencing.pptx.
</commit_message>
<xml_diff>
--- a/Georeferencing.pptx
+++ b/Georeferencing.pptx
@@ -3553,8 +3553,8 @@
         </p:nvSpPr>
         <p:spPr>
           <a:xfrm>
-            <a:off x="2567211" y="2188616"/>
-            <a:ext cx="3404932" cy="923330"/>
+            <a:off x="2567210" y="2188616"/>
+            <a:ext cx="3607607" cy="923330"/>
           </a:xfrm>
           <a:prstGeom prst="rect">
             <a:avLst/>
@@ -3571,8 +3571,12 @@
               <a:buAutoNum type="arabicParenR"/>
             </a:pPr>
             <a:r>
+              <a:rPr lang="en-US" strike="sngStrike" dirty="0" smtClean="0"/>
+              <a:t>Stars</a:t>
+            </a:r>
+            <a:r>
               <a:rPr lang="en-US" dirty="0" smtClean="0"/>
-              <a:t>Stars</a:t>
+              <a:t> (these can be masked out)</a:t>
             </a:r>
           </a:p>
           <a:p>

</xml_diff>